<commit_message>
changes to upload port
</commit_message>
<xml_diff>
--- a/presentation/Presentation.pptx
+++ b/presentation/Presentation.pptx
@@ -6051,6 +6051,12 @@
             <a:r>
               <a:rPr lang="en-US" dirty="0"/>
               <a:t>Rethink tags and searching. </a:t>
+            </a:r>
+          </a:p>
+          <a:p>
+            <a:r>
+              <a:rPr lang="en-US" dirty="0"/>
+              <a:t>Mobile-friendly</a:t>
             </a:r>
           </a:p>
           <a:p>

</xml_diff>